<commit_message>
PPT explaining the Process
</commit_message>
<xml_diff>
--- a/docs/Data Quality Scorecard.pptx
+++ b/docs/Data Quality Scorecard.pptx
@@ -5,7 +5,7 @@
     <p:sldMasterId id="2147483672" r:id="rId1"/>
   </p:sldMasterIdLst>
   <p:notesMasterIdLst>
-    <p:notesMasterId r:id="rId10"/>
+    <p:notesMasterId r:id="rId11"/>
   </p:notesMasterIdLst>
   <p:sldIdLst>
     <p:sldId id="258" r:id="rId2"/>
@@ -16,6 +16,7 @@
     <p:sldId id="264" r:id="rId7"/>
     <p:sldId id="263" r:id="rId8"/>
     <p:sldId id="265" r:id="rId9"/>
+    <p:sldId id="266" r:id="rId10"/>
   </p:sldIdLst>
   <p:sldSz cx="12192000" cy="6858000"/>
   <p:notesSz cx="6858000" cy="9144000"/>
@@ -114,6 +115,11 @@
       </a:defRPr>
     </a:lvl9pPr>
   </p:defaultTextStyle>
+  <p:extLst>
+    <p:ext uri="{EFAFB233-063F-42B5-8137-9DF3F51BA10A}">
+      <p15:sldGuideLst xmlns:p15="http://schemas.microsoft.com/office/powerpoint/2012/main"/>
+    </p:ext>
+  </p:extLst>
 </p:presentation>
 </file>
 
@@ -755,7 +761,7 @@
           <a:p>
             <a:fld id="{CB382806-20E5-42BE-A93D-740E8F64D70E}" type="datetimeFigureOut">
               <a:rPr lang="en-US" smtClean="0"/>
-              <a:t>12/11/2022</a:t>
+              <a:t>12/12/2022</a:t>
             </a:fld>
             <a:endParaRPr lang="en-US"/>
           </a:p>
@@ -1744,7 +1750,7 @@
           <a:p>
             <a:fld id="{8035B303-E496-4232-A3BE-825CA5ABDC39}" type="datetime1">
               <a:rPr lang="en-US" smtClean="0"/>
-              <a:t>12/11/2022</a:t>
+              <a:t>12/12/2022</a:t>
             </a:fld>
             <a:endParaRPr lang="en-US"/>
           </a:p>
@@ -1995,7 +2001,7 @@
           <a:p>
             <a:fld id="{26053F45-88A7-4CB0-8352-CAC574032079}" type="datetime1">
               <a:rPr lang="en-US" smtClean="0"/>
-              <a:t>12/11/2022</a:t>
+              <a:t>12/12/2022</a:t>
             </a:fld>
             <a:endParaRPr lang="en-US"/>
           </a:p>
@@ -2309,7 +2315,7 @@
           <a:p>
             <a:fld id="{0686FF1B-7DA2-455D-8612-84E2366E1171}" type="datetime1">
               <a:rPr lang="en-US" smtClean="0"/>
-              <a:t>12/11/2022</a:t>
+              <a:t>12/12/2022</a:t>
             </a:fld>
             <a:endParaRPr lang="en-US"/>
           </a:p>
@@ -2650,7 +2656,7 @@
           <a:p>
             <a:fld id="{5FB59E3C-3801-4070-AFB9-89D14ED78F0E}" type="datetime1">
               <a:rPr lang="en-US" smtClean="0"/>
-              <a:t>12/11/2022</a:t>
+              <a:t>12/12/2022</a:t>
             </a:fld>
             <a:endParaRPr lang="en-US"/>
           </a:p>
@@ -2964,7 +2970,7 @@
           <a:p>
             <a:fld id="{B6F3F2BA-BE11-4D5C-AC07-67A9B9C3D794}" type="datetime1">
               <a:rPr lang="en-US" smtClean="0"/>
-              <a:t>12/11/2022</a:t>
+              <a:t>12/12/2022</a:t>
             </a:fld>
             <a:endParaRPr lang="en-US"/>
           </a:p>
@@ -3357,7 +3363,7 @@
           <a:p>
             <a:fld id="{FEB3B67E-7206-4F47-B649-3DB32973045C}" type="datetime1">
               <a:rPr lang="en-US" smtClean="0"/>
-              <a:t>12/11/2022</a:t>
+              <a:t>12/12/2022</a:t>
             </a:fld>
             <a:endParaRPr lang="en-US"/>
           </a:p>
@@ -3527,7 +3533,7 @@
           <a:p>
             <a:fld id="{91C7FCDF-9571-46E0-9B6C-69950A8C9471}" type="datetime1">
               <a:rPr lang="en-US" smtClean="0"/>
-              <a:t>12/11/2022</a:t>
+              <a:t>12/12/2022</a:t>
             </a:fld>
             <a:endParaRPr lang="en-US"/>
           </a:p>
@@ -3707,7 +3713,7 @@
           <a:p>
             <a:fld id="{688D512A-0F36-49AC-937D-B44BE4075ED9}" type="datetime1">
               <a:rPr lang="en-US" smtClean="0"/>
-              <a:t>12/11/2022</a:t>
+              <a:t>12/12/2022</a:t>
             </a:fld>
             <a:endParaRPr lang="en-US"/>
           </a:p>
@@ -3883,7 +3889,7 @@
           <a:p>
             <a:fld id="{8DCE17FE-8A02-4DA0-BAF8-F1508CED0D85}" type="datetime1">
               <a:rPr lang="en-US" smtClean="0"/>
-              <a:t>12/11/2022</a:t>
+              <a:t>12/12/2022</a:t>
             </a:fld>
             <a:endParaRPr lang="en-US"/>
           </a:p>
@@ -4130,7 +4136,7 @@
           <a:p>
             <a:fld id="{816E909D-2E07-424D-A4AA-2781AAB32AAB}" type="datetime1">
               <a:rPr lang="en-US" smtClean="0"/>
-              <a:t>12/11/2022</a:t>
+              <a:t>12/12/2022</a:t>
             </a:fld>
             <a:endParaRPr lang="en-US"/>
           </a:p>
@@ -4362,7 +4368,7 @@
           <a:p>
             <a:fld id="{3E31CE64-223F-4BE3-A9A6-65241BFA3D9A}" type="datetime1">
               <a:rPr lang="en-US" smtClean="0"/>
-              <a:t>12/11/2022</a:t>
+              <a:t>12/12/2022</a:t>
             </a:fld>
             <a:endParaRPr lang="en-US"/>
           </a:p>
@@ -4736,7 +4742,7 @@
           <a:p>
             <a:fld id="{07E4285D-9FE8-4B26-A562-2DDF9AC87C3F}" type="datetime1">
               <a:rPr lang="en-US" smtClean="0"/>
-              <a:t>12/11/2022</a:t>
+              <a:t>12/12/2022</a:t>
             </a:fld>
             <a:endParaRPr lang="en-US"/>
           </a:p>
@@ -4859,7 +4865,7 @@
           <a:p>
             <a:fld id="{BDB7145A-6AAA-4957-8B82-D45DA3035DCE}" type="datetime1">
               <a:rPr lang="en-US" smtClean="0"/>
-              <a:t>12/11/2022</a:t>
+              <a:t>12/12/2022</a:t>
             </a:fld>
             <a:endParaRPr lang="en-US"/>
           </a:p>
@@ -4954,7 +4960,7 @@
           <a:p>
             <a:fld id="{D37B1953-918B-4E50-AD41-76AF50CCC42F}" type="datetime1">
               <a:rPr lang="en-US" smtClean="0"/>
-              <a:t>12/11/2022</a:t>
+              <a:t>12/12/2022</a:t>
             </a:fld>
             <a:endParaRPr lang="en-US"/>
           </a:p>
@@ -5209,7 +5215,7 @@
           <a:p>
             <a:fld id="{465E8C4A-B0A3-477E-A848-409282C644A9}" type="datetime1">
               <a:rPr lang="en-US" smtClean="0"/>
-              <a:t>12/11/2022</a:t>
+              <a:t>12/12/2022</a:t>
             </a:fld>
             <a:endParaRPr lang="en-US"/>
           </a:p>
@@ -5472,7 +5478,7 @@
           <a:p>
             <a:fld id="{EFB35414-7502-4514-8420-5754C859CAB6}" type="datetime1">
               <a:rPr lang="en-US" smtClean="0"/>
-              <a:t>12/11/2022</a:t>
+              <a:t>12/12/2022</a:t>
             </a:fld>
             <a:endParaRPr lang="en-US"/>
           </a:p>
@@ -6215,7 +6221,7 @@
           <a:p>
             <a:fld id="{57B17BEF-C15C-48DC-A0CC-8E95C98C1CBD}" type="datetime1">
               <a:rPr lang="en-US" smtClean="0"/>
-              <a:t>12/11/2022</a:t>
+              <a:t>12/12/2022</a:t>
             </a:fld>
             <a:endParaRPr lang="en-US"/>
           </a:p>
@@ -6756,7 +6762,7 @@
                 <a16:creationId xmlns:a16="http://schemas.microsoft.com/office/drawing/2014/main" id="{9179DE42-5613-4B35-A1E6-6CCBAA13C743}"/>
               </a:ext>
               <a:ext uri="{C183D7F6-B498-43B3-948B-1728B52AA6E4}">
-                <adec:decorative xmlns:adec="http://schemas.microsoft.com/office/drawing/2017/decorative" val="1"/>
+                <adec:decorative xmlns:adec="http://schemas.microsoft.com/office/drawing/2017/decorative" xmlns="" val="1"/>
               </a:ext>
             </a:extLst>
           </p:cNvPr>
@@ -6816,7 +6822,7 @@
                 <a16:creationId xmlns:a16="http://schemas.microsoft.com/office/drawing/2014/main" id="{EB898B32-3891-4C3A-8F58-C5969D2E9033}"/>
               </a:ext>
               <a:ext uri="{C183D7F6-B498-43B3-948B-1728B52AA6E4}">
-                <adec:decorative xmlns:adec="http://schemas.microsoft.com/office/drawing/2017/decorative" val="1"/>
+                <adec:decorative xmlns:adec="http://schemas.microsoft.com/office/drawing/2017/decorative" xmlns="" val="1"/>
               </a:ext>
             </a:extLst>
           </p:cNvPr>
@@ -6870,7 +6876,7 @@
                 <a16:creationId xmlns:a16="http://schemas.microsoft.com/office/drawing/2014/main" id="{4AE4806D-B8F9-4679-A68A-9BD21C01A301}"/>
               </a:ext>
               <a:ext uri="{C183D7F6-B498-43B3-948B-1728B52AA6E4}">
-                <adec:decorative xmlns:adec="http://schemas.microsoft.com/office/drawing/2017/decorative" val="1"/>
+                <adec:decorative xmlns:adec="http://schemas.microsoft.com/office/drawing/2017/decorative" xmlns="" val="1"/>
               </a:ext>
             </a:extLst>
           </p:cNvPr>
@@ -6926,7 +6932,7 @@
                 <a16:creationId xmlns:a16="http://schemas.microsoft.com/office/drawing/2014/main" id="{52FB45E9-914E-4471-AC87-E475CD51767D}"/>
               </a:ext>
               <a:ext uri="{C183D7F6-B498-43B3-948B-1728B52AA6E4}">
-                <adec:decorative xmlns:adec="http://schemas.microsoft.com/office/drawing/2017/decorative" val="1"/>
+                <adec:decorative xmlns:adec="http://schemas.microsoft.com/office/drawing/2017/decorative" xmlns="" val="1"/>
               </a:ext>
             </a:extLst>
           </p:cNvPr>
@@ -7006,7 +7012,7 @@
                 <a16:creationId xmlns:a16="http://schemas.microsoft.com/office/drawing/2014/main" id="{C310626D-5743-49D4-8F7D-88C4F8F05774}"/>
               </a:ext>
               <a:ext uri="{C183D7F6-B498-43B3-948B-1728B52AA6E4}">
-                <adec:decorative xmlns:adec="http://schemas.microsoft.com/office/drawing/2017/decorative" val="1"/>
+                <adec:decorative xmlns:adec="http://schemas.microsoft.com/office/drawing/2017/decorative" xmlns="" val="1"/>
               </a:ext>
             </a:extLst>
           </p:cNvPr>
@@ -7086,7 +7092,7 @@
                 <a16:creationId xmlns:a16="http://schemas.microsoft.com/office/drawing/2014/main" id="{3C195FC1-B568-4C72-9902-34CB35DDD7A1}"/>
               </a:ext>
               <a:ext uri="{C183D7F6-B498-43B3-948B-1728B52AA6E4}">
-                <adec:decorative xmlns:adec="http://schemas.microsoft.com/office/drawing/2017/decorative" val="1"/>
+                <adec:decorative xmlns:adec="http://schemas.microsoft.com/office/drawing/2017/decorative" xmlns="" val="1"/>
               </a:ext>
             </a:extLst>
           </p:cNvPr>
@@ -7144,7 +7150,7 @@
                 <a16:creationId xmlns:a16="http://schemas.microsoft.com/office/drawing/2014/main" id="{EF2BDF77-362C-43F0-8CBB-A969EC2AE0C4}"/>
               </a:ext>
               <a:ext uri="{C183D7F6-B498-43B3-948B-1728B52AA6E4}">
-                <adec:decorative xmlns:adec="http://schemas.microsoft.com/office/drawing/2017/decorative" val="1"/>
+                <adec:decorative xmlns:adec="http://schemas.microsoft.com/office/drawing/2017/decorative" xmlns="" val="1"/>
               </a:ext>
             </a:extLst>
           </p:cNvPr>
@@ -7225,7 +7231,7 @@
                 <a16:creationId xmlns:a16="http://schemas.microsoft.com/office/drawing/2014/main" id="{4BE96B01-3929-432D-B8C2-ADBCB74C2EF4}"/>
               </a:ext>
               <a:ext uri="{C183D7F6-B498-43B3-948B-1728B52AA6E4}">
-                <adec:decorative xmlns:adec="http://schemas.microsoft.com/office/drawing/2017/decorative" val="1"/>
+                <adec:decorative xmlns:adec="http://schemas.microsoft.com/office/drawing/2017/decorative" xmlns="" val="1"/>
               </a:ext>
             </a:extLst>
           </p:cNvPr>
@@ -7283,7 +7289,7 @@
                 <a16:creationId xmlns:a16="http://schemas.microsoft.com/office/drawing/2014/main" id="{2A6FCDE6-CDE2-4C51-B18E-A95CFB679714}"/>
               </a:ext>
               <a:ext uri="{C183D7F6-B498-43B3-948B-1728B52AA6E4}">
-                <adec:decorative xmlns:adec="http://schemas.microsoft.com/office/drawing/2017/decorative" val="1"/>
+                <adec:decorative xmlns:adec="http://schemas.microsoft.com/office/drawing/2017/decorative" xmlns="" val="1"/>
               </a:ext>
             </a:extLst>
           </p:cNvPr>
@@ -7508,7 +7514,7 @@
                 <a16:creationId xmlns:a16="http://schemas.microsoft.com/office/drawing/2014/main" id="{9D2E8756-2465-473A-BA2A-2DB1D6224745}"/>
               </a:ext>
               <a:ext uri="{C183D7F6-B498-43B3-948B-1728B52AA6E4}">
-                <adec:decorative xmlns:adec="http://schemas.microsoft.com/office/drawing/2017/decorative" val="1"/>
+                <adec:decorative xmlns:adec="http://schemas.microsoft.com/office/drawing/2017/decorative" xmlns="" val="1"/>
               </a:ext>
             </a:extLst>
           </p:cNvPr>
@@ -7841,7 +7847,7 @@
                 <a16:creationId xmlns:a16="http://schemas.microsoft.com/office/drawing/2014/main" id="{A65AC7D1-EAA9-48F5-B509-60A7F50BF703}"/>
               </a:ext>
               <a:ext uri="{C183D7F6-B498-43B3-948B-1728B52AA6E4}">
-                <adec:decorative xmlns:adec="http://schemas.microsoft.com/office/drawing/2017/decorative" val="1"/>
+                <adec:decorative xmlns:adec="http://schemas.microsoft.com/office/drawing/2017/decorative" xmlns="" val="1"/>
               </a:ext>
             </a:extLst>
           </p:cNvPr>
@@ -7901,7 +7907,7 @@
                 <a16:creationId xmlns:a16="http://schemas.microsoft.com/office/drawing/2014/main" id="{D6320AF9-619A-4175-865B-5663E1AEF4C5}"/>
               </a:ext>
               <a:ext uri="{C183D7F6-B498-43B3-948B-1728B52AA6E4}">
-                <adec:decorative xmlns:adec="http://schemas.microsoft.com/office/drawing/2017/decorative" val="1"/>
+                <adec:decorative xmlns:adec="http://schemas.microsoft.com/office/drawing/2017/decorative" xmlns="" val="1"/>
               </a:ext>
             </a:extLst>
           </p:cNvPr>
@@ -7961,7 +7967,7 @@
                 <a16:creationId xmlns:a16="http://schemas.microsoft.com/office/drawing/2014/main" id="{063B6EC6-D752-4EE7-908B-F8F19E8C7FEA}"/>
               </a:ext>
               <a:ext uri="{C183D7F6-B498-43B3-948B-1728B52AA6E4}">
-                <adec:decorative xmlns:adec="http://schemas.microsoft.com/office/drawing/2017/decorative" val="1"/>
+                <adec:decorative xmlns:adec="http://schemas.microsoft.com/office/drawing/2017/decorative" xmlns="" val="1"/>
               </a:ext>
             </a:extLst>
           </p:cNvPr>
@@ -8015,7 +8021,7 @@
                 <a16:creationId xmlns:a16="http://schemas.microsoft.com/office/drawing/2014/main" id="{EFECD4E8-AD3E-4228-82A2-9461958EA94D}"/>
               </a:ext>
               <a:ext uri="{C183D7F6-B498-43B3-948B-1728B52AA6E4}">
-                <adec:decorative xmlns:adec="http://schemas.microsoft.com/office/drawing/2017/decorative" val="1"/>
+                <adec:decorative xmlns:adec="http://schemas.microsoft.com/office/drawing/2017/decorative" xmlns="" val="1"/>
               </a:ext>
             </a:extLst>
           </p:cNvPr>
@@ -8071,7 +8077,7 @@
                 <a16:creationId xmlns:a16="http://schemas.microsoft.com/office/drawing/2014/main" id="{7E018740-5C2B-4A41-AC1A-7E68D1EC1954}"/>
               </a:ext>
               <a:ext uri="{C183D7F6-B498-43B3-948B-1728B52AA6E4}">
-                <adec:decorative xmlns:adec="http://schemas.microsoft.com/office/drawing/2017/decorative" val="1"/>
+                <adec:decorative xmlns:adec="http://schemas.microsoft.com/office/drawing/2017/decorative" xmlns="" val="1"/>
               </a:ext>
             </a:extLst>
           </p:cNvPr>
@@ -8151,7 +8157,7 @@
                 <a16:creationId xmlns:a16="http://schemas.microsoft.com/office/drawing/2014/main" id="{166F75A4-C475-4941-8EE2-B80A06A2C1BB}"/>
               </a:ext>
               <a:ext uri="{C183D7F6-B498-43B3-948B-1728B52AA6E4}">
-                <adec:decorative xmlns:adec="http://schemas.microsoft.com/office/drawing/2017/decorative" val="1"/>
+                <adec:decorative xmlns:adec="http://schemas.microsoft.com/office/drawing/2017/decorative" xmlns="" val="1"/>
               </a:ext>
             </a:extLst>
           </p:cNvPr>
@@ -8231,7 +8237,7 @@
                 <a16:creationId xmlns:a16="http://schemas.microsoft.com/office/drawing/2014/main" id="{A032553A-72E8-4B0D-8405-FF9771C9AF05}"/>
               </a:ext>
               <a:ext uri="{C183D7F6-B498-43B3-948B-1728B52AA6E4}">
-                <adec:decorative xmlns:adec="http://schemas.microsoft.com/office/drawing/2017/decorative" val="1"/>
+                <adec:decorative xmlns:adec="http://schemas.microsoft.com/office/drawing/2017/decorative" xmlns="" val="1"/>
               </a:ext>
             </a:extLst>
           </p:cNvPr>
@@ -8289,7 +8295,7 @@
                 <a16:creationId xmlns:a16="http://schemas.microsoft.com/office/drawing/2014/main" id="{765800AC-C3B9-498E-87BC-29FAE4C76B21}"/>
               </a:ext>
               <a:ext uri="{C183D7F6-B498-43B3-948B-1728B52AA6E4}">
-                <adec:decorative xmlns:adec="http://schemas.microsoft.com/office/drawing/2017/decorative" val="1"/>
+                <adec:decorative xmlns:adec="http://schemas.microsoft.com/office/drawing/2017/decorative" xmlns="" val="1"/>
               </a:ext>
             </a:extLst>
           </p:cNvPr>
@@ -8370,7 +8376,7 @@
                 <a16:creationId xmlns:a16="http://schemas.microsoft.com/office/drawing/2014/main" id="{1F9D6ACB-2FF4-49F9-978A-E0D5327FC635}"/>
               </a:ext>
               <a:ext uri="{C183D7F6-B498-43B3-948B-1728B52AA6E4}">
-                <adec:decorative xmlns:adec="http://schemas.microsoft.com/office/drawing/2017/decorative" val="1"/>
+                <adec:decorative xmlns:adec="http://schemas.microsoft.com/office/drawing/2017/decorative" xmlns="" val="1"/>
               </a:ext>
             </a:extLst>
           </p:cNvPr>
@@ -8470,7 +8476,7 @@
                 <a16:creationId xmlns:a16="http://schemas.microsoft.com/office/drawing/2014/main" id="{142BFA2A-77A0-4F60-A32A-685681C84889}"/>
               </a:ext>
               <a:ext uri="{C183D7F6-B498-43B3-948B-1728B52AA6E4}">
-                <adec:decorative xmlns:adec="http://schemas.microsoft.com/office/drawing/2017/decorative" val="1"/>
+                <adec:decorative xmlns:adec="http://schemas.microsoft.com/office/drawing/2017/decorative" xmlns="" val="1"/>
               </a:ext>
             </a:extLst>
           </p:cNvPr>
@@ -9108,6 +9114,10 @@
               <a:rPr lang="en-US" i="1" dirty="0"/>
               <a:t>KPIs for DQ Scorecarding – </a:t>
             </a:r>
+            <a:r>
+              <a:rPr lang="en-US" dirty="0"/>
+              <a:t/>
+            </a:r>
             <a:br>
               <a:rPr lang="en-US" dirty="0"/>
             </a:br>
@@ -9560,7 +9570,7 @@
                 <a16:creationId xmlns:a16="http://schemas.microsoft.com/office/drawing/2014/main" id="{1F2B4773-3207-44CC-B7AC-892B70498211}"/>
               </a:ext>
               <a:ext uri="{C183D7F6-B498-43B3-948B-1728B52AA6E4}">
-                <adec:decorative xmlns:adec="http://schemas.microsoft.com/office/drawing/2017/decorative" val="1"/>
+                <adec:decorative xmlns:adec="http://schemas.microsoft.com/office/drawing/2017/decorative" xmlns="" val="1"/>
               </a:ext>
             </a:extLst>
           </p:cNvPr>
@@ -9591,7 +9601,7 @@
                   <a16:creationId xmlns:a16="http://schemas.microsoft.com/office/drawing/2014/main" id="{2B8267CA-A7A5-4E11-9D92-4EAC3DD3E809}"/>
                 </a:ext>
                 <a:ext uri="{C183D7F6-B498-43B3-948B-1728B52AA6E4}">
-                  <adec:decorative xmlns:adec="http://schemas.microsoft.com/office/drawing/2017/decorative" val="1"/>
+                  <adec:decorative xmlns:adec="http://schemas.microsoft.com/office/drawing/2017/decorative" xmlns="" val="1"/>
                 </a:ext>
               </a:extLst>
             </p:cNvPr>
@@ -9643,7 +9653,7 @@
                   <a16:creationId xmlns:a16="http://schemas.microsoft.com/office/drawing/2014/main" id="{E83D61B5-C6B4-4A4B-85AD-FEE7A54912C0}"/>
                 </a:ext>
                 <a:ext uri="{C183D7F6-B498-43B3-948B-1728B52AA6E4}">
-                  <adec:decorative xmlns:adec="http://schemas.microsoft.com/office/drawing/2017/decorative" val="1"/>
+                  <adec:decorative xmlns:adec="http://schemas.microsoft.com/office/drawing/2017/decorative" xmlns="" val="1"/>
                 </a:ext>
               </a:extLst>
             </p:cNvPr>
@@ -9695,7 +9705,7 @@
                   <a16:creationId xmlns:a16="http://schemas.microsoft.com/office/drawing/2014/main" id="{A0B67FE4-688F-4497-8BFD-157613A697D3}"/>
                 </a:ext>
                 <a:ext uri="{C183D7F6-B498-43B3-948B-1728B52AA6E4}">
-                  <adec:decorative xmlns:adec="http://schemas.microsoft.com/office/drawing/2017/decorative" val="1"/>
+                  <adec:decorative xmlns:adec="http://schemas.microsoft.com/office/drawing/2017/decorative" xmlns="" val="1"/>
                 </a:ext>
               </a:extLst>
             </p:cNvPr>
@@ -9773,7 +9783,7 @@
                   <a16:creationId xmlns:a16="http://schemas.microsoft.com/office/drawing/2014/main" id="{3BF5BE1A-9BAC-4581-A82B-FD8FE31595B4}"/>
                 </a:ext>
                 <a:ext uri="{C183D7F6-B498-43B3-948B-1728B52AA6E4}">
-                  <adec:decorative xmlns:adec="http://schemas.microsoft.com/office/drawing/2017/decorative" val="1"/>
+                  <adec:decorative xmlns:adec="http://schemas.microsoft.com/office/drawing/2017/decorative" xmlns="" val="1"/>
                 </a:ext>
               </a:extLst>
             </p:cNvPr>
@@ -9851,7 +9861,7 @@
                   <a16:creationId xmlns:a16="http://schemas.microsoft.com/office/drawing/2014/main" id="{971E5644-6772-414A-8199-E30BFB02A5DF}"/>
                 </a:ext>
                 <a:ext uri="{C183D7F6-B498-43B3-948B-1728B52AA6E4}">
-                  <adec:decorative xmlns:adec="http://schemas.microsoft.com/office/drawing/2017/decorative" val="1"/>
+                  <adec:decorative xmlns:adec="http://schemas.microsoft.com/office/drawing/2017/decorative" xmlns="" val="1"/>
                 </a:ext>
               </a:extLst>
             </p:cNvPr>
@@ -9907,7 +9917,7 @@
                   <a16:creationId xmlns:a16="http://schemas.microsoft.com/office/drawing/2014/main" id="{E8246D50-BB0C-408E-93FD-7B8D63A7F784}"/>
                 </a:ext>
                 <a:ext uri="{C183D7F6-B498-43B3-948B-1728B52AA6E4}">
-                  <adec:decorative xmlns:adec="http://schemas.microsoft.com/office/drawing/2017/decorative" val="1"/>
+                  <adec:decorative xmlns:adec="http://schemas.microsoft.com/office/drawing/2017/decorative" xmlns="" val="1"/>
                 </a:ext>
               </a:extLst>
             </p:cNvPr>
@@ -9986,7 +9996,7 @@
                   <a16:creationId xmlns:a16="http://schemas.microsoft.com/office/drawing/2014/main" id="{AFBC5D22-68C1-44FB-8181-CB84ECAA83FC}"/>
                 </a:ext>
                 <a:ext uri="{C183D7F6-B498-43B3-948B-1728B52AA6E4}">
-                  <adec:decorative xmlns:adec="http://schemas.microsoft.com/office/drawing/2017/decorative" val="1"/>
+                  <adec:decorative xmlns:adec="http://schemas.microsoft.com/office/drawing/2017/decorative" xmlns="" val="1"/>
                 </a:ext>
               </a:extLst>
             </p:cNvPr>
@@ -10066,7 +10076,7 @@
                   <a16:creationId xmlns:a16="http://schemas.microsoft.com/office/drawing/2014/main" id="{FB6D0FCE-FBDB-4655-A1A7-640B1E86B56A}"/>
                 </a:ext>
                 <a:ext uri="{C183D7F6-B498-43B3-948B-1728B52AA6E4}">
-                  <adec:decorative xmlns:adec="http://schemas.microsoft.com/office/drawing/2017/decorative" val="1"/>
+                  <adec:decorative xmlns:adec="http://schemas.microsoft.com/office/drawing/2017/decorative" xmlns="" val="1"/>
                 </a:ext>
               </a:extLst>
             </p:cNvPr>
@@ -10144,7 +10154,7 @@
                   <a16:creationId xmlns:a16="http://schemas.microsoft.com/office/drawing/2014/main" id="{BC8157DF-FD90-4AD6-B803-3AC0ACD8E6A0}"/>
                 </a:ext>
                 <a:ext uri="{C183D7F6-B498-43B3-948B-1728B52AA6E4}">
-                  <adec:decorative xmlns:adec="http://schemas.microsoft.com/office/drawing/2017/decorative" val="1"/>
+                  <adec:decorative xmlns:adec="http://schemas.microsoft.com/office/drawing/2017/decorative" xmlns="" val="1"/>
                 </a:ext>
               </a:extLst>
             </p:cNvPr>
@@ -10200,7 +10210,7 @@
                   <a16:creationId xmlns:a16="http://schemas.microsoft.com/office/drawing/2014/main" id="{3548B067-9D63-4D21-92EF-CBC9E6338C85}"/>
                 </a:ext>
                 <a:ext uri="{C183D7F6-B498-43B3-948B-1728B52AA6E4}">
-                  <adec:decorative xmlns:adec="http://schemas.microsoft.com/office/drawing/2017/decorative" val="1"/>
+                  <adec:decorative xmlns:adec="http://schemas.microsoft.com/office/drawing/2017/decorative" xmlns="" val="1"/>
                 </a:ext>
               </a:extLst>
             </p:cNvPr>
@@ -11530,6 +11540,10 @@
             <a:br>
               <a:rPr lang="en-US" sz="1000" dirty="0"/>
             </a:br>
+            <a:r>
+              <a:rPr lang="en-US" sz="1000" dirty="0"/>
+              <a:t/>
+            </a:r>
             <a:br>
               <a:rPr lang="en-US" sz="1000" dirty="0"/>
             </a:br>
@@ -13397,6 +13411,147 @@
     <p:extLst>
       <p:ext uri="{BB962C8B-B14F-4D97-AF65-F5344CB8AC3E}">
         <p14:creationId xmlns:p14="http://schemas.microsoft.com/office/powerpoint/2010/main" val="3787652829"/>
+      </p:ext>
+    </p:extLst>
+  </p:cSld>
+  <p:clrMapOvr>
+    <a:masterClrMapping/>
+  </p:clrMapOvr>
+</p:sld>
+</file>
+
+<file path=ppt/slides/slide9.xml><?xml version="1.0" encoding="utf-8"?>
+<p:sld xmlns:a="http://schemas.openxmlformats.org/drawingml/2006/main" xmlns:r="http://schemas.openxmlformats.org/officeDocument/2006/relationships" xmlns:p="http://schemas.openxmlformats.org/presentationml/2006/main">
+  <p:cSld>
+    <p:spTree>
+      <p:nvGrpSpPr>
+        <p:cNvPr id="1" name=""/>
+        <p:cNvGrpSpPr/>
+        <p:nvPr/>
+      </p:nvGrpSpPr>
+      <p:grpSpPr>
+        <a:xfrm>
+          <a:off x="0" y="0"/>
+          <a:ext cx="0" cy="0"/>
+          <a:chOff x="0" y="0"/>
+          <a:chExt cx="0" cy="0"/>
+        </a:xfrm>
+      </p:grpSpPr>
+      <p:sp>
+        <p:nvSpPr>
+          <p:cNvPr id="2" name="Title 1">
+            <a:extLst>
+              <a:ext uri="{FF2B5EF4-FFF2-40B4-BE49-F238E27FC236}">
+                <a16:creationId xmlns:a16="http://schemas.microsoft.com/office/drawing/2014/main" id="{B800E579-B74E-4562-AEC1-11FB1CEBF767}"/>
+              </a:ext>
+            </a:extLst>
+          </p:cNvPr>
+          <p:cNvSpPr>
+            <a:spLocks noGrp="1"/>
+          </p:cNvSpPr>
+          <p:nvPr>
+            <p:ph type="title"/>
+          </p:nvPr>
+        </p:nvSpPr>
+        <p:spPr>
+          <a:xfrm>
+            <a:off x="677334" y="636591"/>
+            <a:ext cx="3854528" cy="867744"/>
+          </a:xfrm>
+        </p:spPr>
+        <p:txBody>
+          <a:bodyPr/>
+          <a:lstStyle/>
+          <a:p>
+            <a:r>
+              <a:rPr lang="en-US" dirty="0" smtClean="0"/>
+              <a:t>Data Quality Scorecard Generated</a:t>
+            </a:r>
+            <a:endParaRPr lang="en-US" dirty="0"/>
+          </a:p>
+        </p:txBody>
+      </p:sp>
+      <p:sp>
+        <p:nvSpPr>
+          <p:cNvPr id="5" name="Slide Number Placeholder 4">
+            <a:extLst>
+              <a:ext uri="{FF2B5EF4-FFF2-40B4-BE49-F238E27FC236}">
+                <a16:creationId xmlns:a16="http://schemas.microsoft.com/office/drawing/2014/main" id="{B1A1AA75-3C02-49FA-9A3A-985E573D59EF}"/>
+              </a:ext>
+            </a:extLst>
+          </p:cNvPr>
+          <p:cNvSpPr>
+            <a:spLocks noGrp="1"/>
+          </p:cNvSpPr>
+          <p:nvPr>
+            <p:ph type="sldNum" sz="quarter" idx="12"/>
+          </p:nvPr>
+        </p:nvSpPr>
+        <p:spPr/>
+        <p:txBody>
+          <a:bodyPr/>
+          <a:lstStyle/>
+          <a:p>
+            <a:fld id="{62019D8D-D2C0-4746-B0CC-8A4E7681B126}" type="slidenum">
+              <a:rPr lang="en-US" smtClean="0"/>
+              <a:t>9</a:t>
+            </a:fld>
+            <a:endParaRPr lang="en-US"/>
+          </a:p>
+        </p:txBody>
+      </p:sp>
+      <p:pic>
+        <p:nvPicPr>
+          <p:cNvPr id="9" name="Picture 8"/>
+          <p:cNvPicPr>
+            <a:picLocks noChangeAspect="1"/>
+          </p:cNvPicPr>
+          <p:nvPr/>
+        </p:nvPicPr>
+        <p:blipFill>
+          <a:blip r:embed="rId2"/>
+          <a:stretch>
+            <a:fillRect/>
+          </a:stretch>
+        </p:blipFill>
+        <p:spPr>
+          <a:xfrm>
+            <a:off x="132734" y="1504335"/>
+            <a:ext cx="12002115" cy="2447925"/>
+          </a:xfrm>
+          <a:prstGeom prst="rect">
+            <a:avLst/>
+          </a:prstGeom>
+        </p:spPr>
+      </p:pic>
+      <p:pic>
+        <p:nvPicPr>
+          <p:cNvPr id="10" name="Picture 9"/>
+          <p:cNvPicPr>
+            <a:picLocks noChangeAspect="1"/>
+          </p:cNvPicPr>
+          <p:nvPr/>
+        </p:nvPicPr>
+        <p:blipFill>
+          <a:blip r:embed="rId3"/>
+          <a:stretch>
+            <a:fillRect/>
+          </a:stretch>
+        </p:blipFill>
+        <p:spPr>
+          <a:xfrm>
+            <a:off x="2398764" y="4142299"/>
+            <a:ext cx="6686550" cy="2466975"/>
+          </a:xfrm>
+          <a:prstGeom prst="rect">
+            <a:avLst/>
+          </a:prstGeom>
+        </p:spPr>
+      </p:pic>
+    </p:spTree>
+    <p:extLst>
+      <p:ext uri="{BB962C8B-B14F-4D97-AF65-F5344CB8AC3E}">
+        <p14:creationId xmlns:p14="http://schemas.microsoft.com/office/powerpoint/2010/main" val="3665979562"/>
       </p:ext>
     </p:extLst>
   </p:cSld>

</xml_diff>